<commit_message>
Pre-tutorial update Week 4
</commit_message>
<xml_diff>
--- a/Tutorial 4 ADC Random Fourier.pptx
+++ b/Tutorial 4 ADC Random Fourier.pptx
@@ -5,10 +5,10 @@
     <p:sldMasterId id="2147483648" r:id="rId4"/>
   </p:sldMasterIdLst>
   <p:notesMasterIdLst>
-    <p:notesMasterId r:id="rId17"/>
+    <p:notesMasterId r:id="rId19"/>
   </p:notesMasterIdLst>
   <p:handoutMasterIdLst>
-    <p:handoutMasterId r:id="rId18"/>
+    <p:handoutMasterId r:id="rId20"/>
   </p:handoutMasterIdLst>
   <p:sldIdLst>
     <p:sldId id="256" r:id="rId5"/>
@@ -22,7 +22,9 @@
     <p:sldId id="269" r:id="rId13"/>
     <p:sldId id="261" r:id="rId14"/>
     <p:sldId id="262" r:id="rId15"/>
-    <p:sldId id="270" r:id="rId16"/>
+    <p:sldId id="271" r:id="rId16"/>
+    <p:sldId id="272" r:id="rId17"/>
+    <p:sldId id="270" r:id="rId18"/>
   </p:sldIdLst>
   <p:sldSz cx="12192000" cy="6858000"/>
   <p:notesSz cx="6858000" cy="9144000"/>
@@ -225,7 +227,7 @@
           <a:p>
             <a:fld id="{762B48F5-BACC-47D6-A0F7-82FBF9C6BC85}" type="datetimeFigureOut">
               <a:rPr lang="en-US"/>
-              <a:t>3/8/2021</a:t>
+              <a:t>3/11/2022</a:t>
             </a:fld>
             <a:endParaRPr/>
           </a:p>
@@ -390,7 +392,7 @@
           <a:p>
             <a:fld id="{0CB1CD00-5424-4675-AB18-2C419B060449}" type="datetimeFigureOut">
               <a:rPr lang="en-US"/>
-              <a:t>3/8/2021</a:t>
+              <a:t>3/11/2022</a:t>
             </a:fld>
             <a:endParaRPr/>
           </a:p>
@@ -1035,7 +1037,7 @@
           <a:p>
             <a:fld id="{37CC0096-1860-4642-9CD2-0079EA5E7CD1}" type="datetimeFigureOut">
               <a:rPr lang="en-US" smtClean="0"/>
-              <a:t>3/8/2021</a:t>
+              <a:t>3/11/2022</a:t>
             </a:fld>
             <a:endParaRPr lang="en-US"/>
           </a:p>
@@ -1214,7 +1216,7 @@
           <a:p>
             <a:fld id="{37CC0096-1860-4642-9CD2-0079EA5E7CD1}" type="datetimeFigureOut">
               <a:rPr lang="en-US" smtClean="0"/>
-              <a:t>3/8/2021</a:t>
+              <a:t>3/11/2022</a:t>
             </a:fld>
             <a:endParaRPr lang="en-US"/>
           </a:p>
@@ -1387,7 +1389,7 @@
           <a:p>
             <a:fld id="{37CC0096-1860-4642-9CD2-0079EA5E7CD1}" type="datetimeFigureOut">
               <a:rPr lang="en-US" smtClean="0"/>
-              <a:t>3/8/2021</a:t>
+              <a:t>3/11/2022</a:t>
             </a:fld>
             <a:endParaRPr lang="en-US"/>
           </a:p>
@@ -1820,7 +1822,7 @@
           <a:p>
             <a:fld id="{37CC0096-1860-4642-9CD2-0079EA5E7CD1}" type="datetimeFigureOut">
               <a:rPr lang="en-US" smtClean="0"/>
-              <a:t>3/8/2021</a:t>
+              <a:t>3/11/2022</a:t>
             </a:fld>
             <a:endParaRPr lang="en-US"/>
           </a:p>
@@ -2259,7 +2261,7 @@
           <a:p>
             <a:fld id="{37CC0096-1860-4642-9CD2-0079EA5E7CD1}" type="datetimeFigureOut">
               <a:rPr lang="en-US" smtClean="0"/>
-              <a:t>3/8/2021</a:t>
+              <a:t>3/11/2022</a:t>
             </a:fld>
             <a:endParaRPr lang="en-US"/>
           </a:p>
@@ -2376,7 +2378,7 @@
           <a:p>
             <a:fld id="{37CC0096-1860-4642-9CD2-0079EA5E7CD1}" type="datetimeFigureOut">
               <a:rPr lang="en-US" smtClean="0"/>
-              <a:t>3/8/2021</a:t>
+              <a:t>3/11/2022</a:t>
             </a:fld>
             <a:endParaRPr lang="en-US"/>
           </a:p>
@@ -2471,7 +2473,7 @@
           <a:p>
             <a:fld id="{37CC0096-1860-4642-9CD2-0079EA5E7CD1}" type="datetimeFigureOut">
               <a:rPr lang="en-US" smtClean="0"/>
-              <a:t>3/8/2021</a:t>
+              <a:t>3/11/2022</a:t>
             </a:fld>
             <a:endParaRPr lang="en-US"/>
           </a:p>
@@ -2755,7 +2757,7 @@
           <a:p>
             <a:fld id="{37CC0096-1860-4642-9CD2-0079EA5E7CD1}" type="datetimeFigureOut">
               <a:rPr lang="en-US" smtClean="0"/>
-              <a:t>3/8/2021</a:t>
+              <a:t>3/11/2022</a:t>
             </a:fld>
             <a:endParaRPr lang="en-US"/>
           </a:p>
@@ -3066,7 +3068,7 @@
           <a:p>
             <a:fld id="{37CC0096-1860-4642-9CD2-0079EA5E7CD1}" type="datetimeFigureOut">
               <a:rPr lang="en-US" smtClean="0"/>
-              <a:t>3/8/2021</a:t>
+              <a:t>3/11/2022</a:t>
             </a:fld>
             <a:endParaRPr lang="en-US"/>
           </a:p>
@@ -3298,7 +3300,7 @@
             <a:fld id="{37CC0096-1860-4642-9CD2-0079EA5E7CD1}" type="datetimeFigureOut">
               <a:rPr lang="en-US" smtClean="0"/>
               <a:pPr/>
-              <a:t>3/8/2021</a:t>
+              <a:t>3/11/2022</a:t>
             </a:fld>
             <a:endParaRPr lang="en-US"/>
           </a:p>
@@ -4213,7 +4215,7 @@
           <a:p>
             <a:r>
               <a:rPr lang="en-AU" dirty="0"/>
-              <a:t>If you can’t sample for a longer period of time (i.e. you ALREADY GATHERED YOUR COUPLED PENDULUM DATA), then you can </a:t>
+              <a:t>If you can’t sample for a longer period of time (i.e. you already gathered your data), then you can </a:t>
             </a:r>
             <a:r>
               <a:rPr lang="en-AU" b="1" dirty="0"/>
@@ -4249,6 +4251,306 @@
 </file>
 
 <file path=ppt/slides/slide12.xml><?xml version="1.0" encoding="utf-8"?>
+<p:sld xmlns:a="http://schemas.openxmlformats.org/drawingml/2006/main" xmlns:r="http://schemas.openxmlformats.org/officeDocument/2006/relationships" xmlns:p="http://schemas.openxmlformats.org/presentationml/2006/main">
+  <p:cSld>
+    <p:spTree>
+      <p:nvGrpSpPr>
+        <p:cNvPr id="1" name=""/>
+        <p:cNvGrpSpPr/>
+        <p:nvPr/>
+      </p:nvGrpSpPr>
+      <p:grpSpPr>
+        <a:xfrm>
+          <a:off x="0" y="0"/>
+          <a:ext cx="0" cy="0"/>
+          <a:chOff x="0" y="0"/>
+          <a:chExt cx="0" cy="0"/>
+        </a:xfrm>
+      </p:grpSpPr>
+      <p:sp>
+        <p:nvSpPr>
+          <p:cNvPr id="2" name="Title 1">
+            <a:extLst>
+              <a:ext uri="{FF2B5EF4-FFF2-40B4-BE49-F238E27FC236}">
+                <a16:creationId xmlns:a16="http://schemas.microsoft.com/office/drawing/2014/main" id="{75DA303A-7DDD-40B6-BD4C-B54888987486}"/>
+              </a:ext>
+            </a:extLst>
+          </p:cNvPr>
+          <p:cNvSpPr>
+            <a:spLocks noGrp="1"/>
+          </p:cNvSpPr>
+          <p:nvPr>
+            <p:ph type="title"/>
+          </p:nvPr>
+        </p:nvSpPr>
+        <p:spPr/>
+        <p:txBody>
+          <a:bodyPr/>
+          <a:lstStyle/>
+          <a:p>
+            <a:r>
+              <a:rPr lang="en-US" dirty="0"/>
+              <a:t>2D Fourier transforms</a:t>
+            </a:r>
+            <a:endParaRPr lang="en-AU" dirty="0"/>
+          </a:p>
+        </p:txBody>
+      </p:sp>
+      <p:grpSp>
+        <p:nvGrpSpPr>
+          <p:cNvPr id="6" name="Group 5">
+            <a:extLst>
+              <a:ext uri="{FF2B5EF4-FFF2-40B4-BE49-F238E27FC236}">
+                <a16:creationId xmlns:a16="http://schemas.microsoft.com/office/drawing/2014/main" id="{037A7236-0E15-42F3-8901-26A16A164C4D}"/>
+              </a:ext>
+            </a:extLst>
+          </p:cNvPr>
+          <p:cNvGrpSpPr/>
+          <p:nvPr/>
+        </p:nvGrpSpPr>
+        <p:grpSpPr>
+          <a:xfrm>
+            <a:off x="1055440" y="1864296"/>
+            <a:ext cx="4536505" cy="4536504"/>
+            <a:chOff x="767407" y="1988840"/>
+            <a:chExt cx="4536505" cy="4536504"/>
+          </a:xfrm>
+        </p:grpSpPr>
+        <p:sp>
+          <p:nvSpPr>
+            <p:cNvPr id="5" name="Rectangle 4">
+              <a:extLst>
+                <a:ext uri="{FF2B5EF4-FFF2-40B4-BE49-F238E27FC236}">
+                  <a16:creationId xmlns:a16="http://schemas.microsoft.com/office/drawing/2014/main" id="{C5AB5219-545E-45CE-8976-F4A5F2121E87}"/>
+                </a:ext>
+              </a:extLst>
+            </p:cNvPr>
+            <p:cNvSpPr/>
+            <p:nvPr/>
+          </p:nvSpPr>
+          <p:spPr>
+            <a:xfrm>
+              <a:off x="767407" y="1988840"/>
+              <a:ext cx="4536505" cy="4536504"/>
+            </a:xfrm>
+            <a:prstGeom prst="rect">
+              <a:avLst/>
+            </a:prstGeom>
+            <a:solidFill>
+              <a:schemeClr val="tx1">
+                <a:lumMod val="85000"/>
+              </a:schemeClr>
+            </a:solidFill>
+            <a:ln>
+              <a:noFill/>
+            </a:ln>
+          </p:spPr>
+          <p:style>
+            <a:lnRef idx="2">
+              <a:schemeClr val="accent1">
+                <a:shade val="50000"/>
+              </a:schemeClr>
+            </a:lnRef>
+            <a:fillRef idx="1">
+              <a:schemeClr val="accent1"/>
+            </a:fillRef>
+            <a:effectRef idx="0">
+              <a:schemeClr val="accent1"/>
+            </a:effectRef>
+            <a:fontRef idx="minor">
+              <a:schemeClr val="lt1"/>
+            </a:fontRef>
+          </p:style>
+          <p:txBody>
+            <a:bodyPr rtlCol="0" anchor="ctr"/>
+            <a:lstStyle/>
+            <a:p>
+              <a:pPr algn="ctr"/>
+              <a:endParaRPr lang="en-AU"/>
+            </a:p>
+          </p:txBody>
+        </p:sp>
+        <p:pic>
+          <p:nvPicPr>
+            <p:cNvPr id="4" name="Picture 3">
+              <a:extLst>
+                <a:ext uri="{FF2B5EF4-FFF2-40B4-BE49-F238E27FC236}">
+                  <a16:creationId xmlns:a16="http://schemas.microsoft.com/office/drawing/2014/main" id="{AD55AD2D-F86B-48B0-A425-224B3E6B5862}"/>
+                </a:ext>
+              </a:extLst>
+            </p:cNvPr>
+            <p:cNvPicPr>
+              <a:picLocks noChangeAspect="1"/>
+            </p:cNvPicPr>
+            <p:nvPr/>
+          </p:nvPicPr>
+          <p:blipFill>
+            <a:blip r:embed="rId2"/>
+            <a:stretch>
+              <a:fillRect/>
+            </a:stretch>
+          </p:blipFill>
+          <p:spPr>
+            <a:xfrm>
+              <a:off x="851966" y="2073399"/>
+              <a:ext cx="4367386" cy="4367386"/>
+            </a:xfrm>
+            <a:prstGeom prst="rect">
+              <a:avLst/>
+            </a:prstGeom>
+          </p:spPr>
+        </p:pic>
+      </p:grpSp>
+      <p:pic>
+        <p:nvPicPr>
+          <p:cNvPr id="7" name="Picture 6">
+            <a:extLst>
+              <a:ext uri="{FF2B5EF4-FFF2-40B4-BE49-F238E27FC236}">
+                <a16:creationId xmlns:a16="http://schemas.microsoft.com/office/drawing/2014/main" id="{C6D69CA8-FABE-46A2-9DB7-7EF09BC3FE92}"/>
+              </a:ext>
+            </a:extLst>
+          </p:cNvPr>
+          <p:cNvPicPr>
+            <a:picLocks noChangeAspect="1"/>
+          </p:cNvPicPr>
+          <p:nvPr/>
+        </p:nvPicPr>
+        <p:blipFill>
+          <a:blip r:embed="rId3"/>
+          <a:stretch>
+            <a:fillRect/>
+          </a:stretch>
+        </p:blipFill>
+        <p:spPr>
+          <a:xfrm>
+            <a:off x="7608168" y="1576111"/>
+            <a:ext cx="3638550" cy="5019675"/>
+          </a:xfrm>
+          <a:prstGeom prst="rect">
+            <a:avLst/>
+          </a:prstGeom>
+        </p:spPr>
+      </p:pic>
+    </p:spTree>
+    <p:extLst>
+      <p:ext uri="{BB962C8B-B14F-4D97-AF65-F5344CB8AC3E}">
+        <p14:creationId xmlns:p14="http://schemas.microsoft.com/office/powerpoint/2010/main" val="2004524246"/>
+      </p:ext>
+    </p:extLst>
+  </p:cSld>
+  <p:clrMapOvr>
+    <a:masterClrMapping/>
+  </p:clrMapOvr>
+</p:sld>
+</file>
+
+<file path=ppt/slides/slide13.xml><?xml version="1.0" encoding="utf-8"?>
+<p:sld xmlns:a="http://schemas.openxmlformats.org/drawingml/2006/main" xmlns:r="http://schemas.openxmlformats.org/officeDocument/2006/relationships" xmlns:p="http://schemas.openxmlformats.org/presentationml/2006/main">
+  <p:cSld>
+    <p:spTree>
+      <p:nvGrpSpPr>
+        <p:cNvPr id="1" name=""/>
+        <p:cNvGrpSpPr/>
+        <p:nvPr/>
+      </p:nvGrpSpPr>
+      <p:grpSpPr>
+        <a:xfrm>
+          <a:off x="0" y="0"/>
+          <a:ext cx="0" cy="0"/>
+          <a:chOff x="0" y="0"/>
+          <a:chExt cx="0" cy="0"/>
+        </a:xfrm>
+      </p:grpSpPr>
+      <p:sp>
+        <p:nvSpPr>
+          <p:cNvPr id="2" name="Title 1">
+            <a:extLst>
+              <a:ext uri="{FF2B5EF4-FFF2-40B4-BE49-F238E27FC236}">
+                <a16:creationId xmlns:a16="http://schemas.microsoft.com/office/drawing/2014/main" id="{75DA303A-7DDD-40B6-BD4C-B54888987486}"/>
+              </a:ext>
+            </a:extLst>
+          </p:cNvPr>
+          <p:cNvSpPr>
+            <a:spLocks noGrp="1"/>
+          </p:cNvSpPr>
+          <p:nvPr>
+            <p:ph type="title"/>
+          </p:nvPr>
+        </p:nvSpPr>
+        <p:spPr/>
+        <p:txBody>
+          <a:bodyPr/>
+          <a:lstStyle/>
+          <a:p>
+            <a:r>
+              <a:rPr lang="en-US" dirty="0"/>
+              <a:t>2D Fourier transforms</a:t>
+            </a:r>
+            <a:endParaRPr lang="en-AU" dirty="0"/>
+          </a:p>
+        </p:txBody>
+      </p:sp>
+      <p:pic>
+        <p:nvPicPr>
+          <p:cNvPr id="1026" name="Picture 2">
+            <a:extLst>
+              <a:ext uri="{FF2B5EF4-FFF2-40B4-BE49-F238E27FC236}">
+                <a16:creationId xmlns:a16="http://schemas.microsoft.com/office/drawing/2014/main" id="{17D3F4AC-BF90-4067-BC1D-E1F48EDFCBF9}"/>
+              </a:ext>
+            </a:extLst>
+          </p:cNvPr>
+          <p:cNvPicPr>
+            <a:picLocks noChangeAspect="1" noChangeArrowheads="1"/>
+          </p:cNvPicPr>
+          <p:nvPr/>
+        </p:nvPicPr>
+        <p:blipFill>
+          <a:blip r:embed="rId2">
+            <a:extLst>
+              <a:ext uri="{28A0092B-C50C-407E-A947-70E740481C1C}">
+                <a14:useLocalDpi xmlns:a14="http://schemas.microsoft.com/office/drawing/2010/main" val="0"/>
+              </a:ext>
+            </a:extLst>
+          </a:blip>
+          <a:srcRect/>
+          <a:stretch>
+            <a:fillRect/>
+          </a:stretch>
+        </p:blipFill>
+        <p:spPr bwMode="auto">
+          <a:xfrm>
+            <a:off x="695400" y="1600200"/>
+            <a:ext cx="10363200" cy="4972050"/>
+          </a:xfrm>
+          <a:prstGeom prst="rect">
+            <a:avLst/>
+          </a:prstGeom>
+          <a:noFill/>
+          <a:extLst>
+            <a:ext uri="{909E8E84-426E-40DD-AFC4-6F175D3DCCD1}">
+              <a14:hiddenFill xmlns:a14="http://schemas.microsoft.com/office/drawing/2010/main">
+                <a:solidFill>
+                  <a:srgbClr val="FFFFFF"/>
+                </a:solidFill>
+              </a14:hiddenFill>
+            </a:ext>
+          </a:extLst>
+        </p:spPr>
+      </p:pic>
+    </p:spTree>
+    <p:extLst>
+      <p:ext uri="{BB962C8B-B14F-4D97-AF65-F5344CB8AC3E}">
+        <p14:creationId xmlns:p14="http://schemas.microsoft.com/office/powerpoint/2010/main" val="235673689"/>
+      </p:ext>
+    </p:extLst>
+  </p:cSld>
+  <p:clrMapOvr>
+    <a:masterClrMapping/>
+  </p:clrMapOvr>
+</p:sld>
+</file>
+
+<file path=ppt/slides/slide14.xml><?xml version="1.0" encoding="utf-8"?>
 <p:sld xmlns:a="http://schemas.openxmlformats.org/drawingml/2006/main" xmlns:r="http://schemas.openxmlformats.org/officeDocument/2006/relationships" xmlns:p="http://schemas.openxmlformats.org/presentationml/2006/main">
   <p:cSld>
     <p:spTree>
@@ -6880,15 +7182,6 @@
 </file>
 
 <file path=customXml/item1.xml><?xml version="1.0" encoding="utf-8"?>
-<?mso-contentType ?>
-<FormTemplates xmlns="http://schemas.microsoft.com/sharepoint/v3/contenttype/forms">
-  <Display>DocumentLibraryForm</Display>
-  <Edit>AssetEditForm</Edit>
-  <New>DocumentLibraryForm</New>
-</FormTemplates>
-</file>
-
-<file path=customXml/item2.xml><?xml version="1.0" encoding="utf-8"?>
 <p:properties xmlns:p="http://schemas.microsoft.com/office/2006/metadata/properties" xmlns:xsi="http://www.w3.org/2001/XMLSchema-instance" xmlns:pc="http://schemas.microsoft.com/office/infopath/2007/PartnerControls">
   <documentManagement>
     <DirectSourceMarket xmlns="4873beb7-5857-4685-be1f-d57550cc96cc" xsi:nil="true"/>
@@ -7012,6 +7305,15 @@
     <LocMarketGroupTiers2 xmlns="4873beb7-5857-4685-be1f-d57550cc96cc" xsi:nil="true"/>
   </documentManagement>
 </p:properties>
+</file>
+
+<file path=customXml/item2.xml><?xml version="1.0" encoding="utf-8"?>
+<?mso-contentType ?>
+<FormTemplates xmlns="http://schemas.microsoft.com/sharepoint/v3/contenttype/forms">
+  <Display>DocumentLibraryForm</Display>
+  <Edit>AssetEditForm</Edit>
+  <New>DocumentLibraryForm</New>
+</FormTemplates>
 </file>
 
 <file path=customXml/item3.xml><?xml version="1.0" encoding="utf-8"?>
@@ -8055,14 +8357,6 @@
 </file>
 
 <file path=customXml/itemProps1.xml><?xml version="1.0" encoding="utf-8"?>
-<ds:datastoreItem xmlns:ds="http://schemas.openxmlformats.org/officeDocument/2006/customXml" ds:itemID="{746CFF6F-D9AA-4BC0-911A-0A1356771912}">
-  <ds:schemaRefs>
-    <ds:schemaRef ds:uri="http://schemas.microsoft.com/sharepoint/v3/contenttype/forms"/>
-  </ds:schemaRefs>
-</ds:datastoreItem>
-</file>
-
-<file path=customXml/itemProps2.xml><?xml version="1.0" encoding="utf-8"?>
 <ds:datastoreItem xmlns:ds="http://schemas.openxmlformats.org/officeDocument/2006/customXml" ds:itemID="{04098515-0C12-46CF-BC7C-69B4A13CD5FA}">
   <ds:schemaRefs>
     <ds:schemaRef ds:uri="http://schemas.microsoft.com/office/2006/documentManagement/types"/>
@@ -8074,6 +8368,14 @@
     <ds:schemaRef ds:uri="http://schemas.openxmlformats.org/package/2006/metadata/core-properties"/>
     <ds:schemaRef ds:uri="http://schemas.microsoft.com/office/infopath/2007/PartnerControls"/>
     <ds:schemaRef ds:uri="http://purl.org/dc/elements/1.1/"/>
+  </ds:schemaRefs>
+</ds:datastoreItem>
+</file>
+
+<file path=customXml/itemProps2.xml><?xml version="1.0" encoding="utf-8"?>
+<ds:datastoreItem xmlns:ds="http://schemas.openxmlformats.org/officeDocument/2006/customXml" ds:itemID="{746CFF6F-D9AA-4BC0-911A-0A1356771912}">
+  <ds:schemaRefs>
+    <ds:schemaRef ds:uri="http://schemas.microsoft.com/sharepoint/v3/contenttype/forms"/>
   </ds:schemaRefs>
 </ds:datastoreItem>
 </file>

</xml_diff>